<commit_message>
Update image of 01-08.png
</commit_message>
<xml_diff>
--- a/A_recipe_for_a_functional_app/Part1.pptx
+++ b/A_recipe_for_a_functional_app/Part1.pptx
@@ -8029,9 +8029,9 @@
           <p:nvPr/>
         </p:nvCxnSpPr>
         <p:spPr>
-          <a:xfrm>
-            <a:off x="1475656" y="652046"/>
-            <a:ext cx="432048" cy="2648"/>
+          <a:xfrm flipV="1">
+            <a:off x="1475656" y="650048"/>
+            <a:ext cx="432048" cy="1998"/>
           </a:xfrm>
           <a:prstGeom prst="straightConnector1">
             <a:avLst/>
@@ -8272,7 +8272,7 @@
         </p:nvSpPr>
         <p:spPr>
           <a:xfrm>
-            <a:off x="6188044" y="678995"/>
+            <a:off x="6189785" y="920068"/>
             <a:ext cx="798617" cy="369332"/>
           </a:xfrm>
           <a:prstGeom prst="rect">
@@ -8332,8 +8332,8 @@
         </p:nvSpPr>
         <p:spPr>
           <a:xfrm>
-            <a:off x="1907704" y="328659"/>
-            <a:ext cx="4176464" cy="652069"/>
+            <a:off x="1907704" y="143993"/>
+            <a:ext cx="4176464" cy="1012109"/>
           </a:xfrm>
           <a:prstGeom prst="rect">
             <a:avLst/>
@@ -8438,6 +8438,96 @@
           </a:prstGeom>
           <a:solidFill>
             <a:srgbClr val="FF0000"/>
+          </a:solidFill>
+        </p:spPr>
+        <p:style>
+          <a:lnRef idx="2">
+            <a:schemeClr val="accent1">
+              <a:shade val="50000"/>
+            </a:schemeClr>
+          </a:lnRef>
+          <a:fillRef idx="1">
+            <a:schemeClr val="accent1"/>
+          </a:fillRef>
+          <a:effectRef idx="0">
+            <a:schemeClr val="accent1"/>
+          </a:effectRef>
+          <a:fontRef idx="minor">
+            <a:schemeClr val="lt1"/>
+          </a:fontRef>
+        </p:style>
+        <p:txBody>
+          <a:bodyPr rtlCol="0" anchor="ctr"/>
+          <a:lstStyle/>
+          <a:p>
+            <a:pPr algn="ctr"/>
+            <a:endParaRPr kumimoji="1" lang="ja-JP" altLang="en-US"/>
+          </a:p>
+        </p:txBody>
+      </p:sp>
+      <p:sp>
+        <p:nvSpPr>
+          <p:cNvPr id="29" name="正方形/長方形 28"/>
+          <p:cNvSpPr/>
+          <p:nvPr/>
+        </p:nvSpPr>
+        <p:spPr>
+          <a:xfrm>
+            <a:off x="6085909" y="725487"/>
+            <a:ext cx="1006371" cy="92984"/>
+          </a:xfrm>
+          <a:prstGeom prst="rect">
+            <a:avLst/>
+          </a:prstGeom>
+          <a:solidFill>
+            <a:schemeClr val="accent2">
+              <a:lumMod val="75000"/>
+            </a:schemeClr>
+          </a:solidFill>
+        </p:spPr>
+        <p:style>
+          <a:lnRef idx="2">
+            <a:schemeClr val="accent1">
+              <a:shade val="50000"/>
+            </a:schemeClr>
+          </a:lnRef>
+          <a:fillRef idx="1">
+            <a:schemeClr val="accent1"/>
+          </a:fillRef>
+          <a:effectRef idx="0">
+            <a:schemeClr val="accent1"/>
+          </a:effectRef>
+          <a:fontRef idx="minor">
+            <a:schemeClr val="lt1"/>
+          </a:fontRef>
+        </p:style>
+        <p:txBody>
+          <a:bodyPr rtlCol="0" anchor="ctr"/>
+          <a:lstStyle/>
+          <a:p>
+            <a:pPr algn="ctr"/>
+            <a:endParaRPr kumimoji="1" lang="ja-JP" altLang="en-US"/>
+          </a:p>
+        </p:txBody>
+      </p:sp>
+      <p:sp>
+        <p:nvSpPr>
+          <p:cNvPr id="30" name="正方形/長方形 29"/>
+          <p:cNvSpPr/>
+          <p:nvPr/>
+        </p:nvSpPr>
+        <p:spPr>
+          <a:xfrm>
+            <a:off x="6078418" y="825412"/>
+            <a:ext cx="1006371" cy="92984"/>
+          </a:xfrm>
+          <a:prstGeom prst="rect">
+            <a:avLst/>
+          </a:prstGeom>
+          <a:solidFill>
+            <a:schemeClr val="accent6">
+              <a:lumMod val="75000"/>
+            </a:schemeClr>
           </a:solidFill>
         </p:spPr>
         <p:style>

</xml_diff>

<commit_message>
Add "Railway oriented programming" article (in progress)
</commit_message>
<xml_diff>
--- a/A_recipe_for_a_functional_app/Part1.pptx
+++ b/A_recipe_for_a_functional_app/Part1.pptx
@@ -15,6 +15,10 @@
     <p:sldId id="263" r:id="rId9"/>
     <p:sldId id="264" r:id="rId10"/>
     <p:sldId id="265" r:id="rId11"/>
+    <p:sldId id="266" r:id="rId12"/>
+    <p:sldId id="267" r:id="rId13"/>
+    <p:sldId id="268" r:id="rId14"/>
+    <p:sldId id="269" r:id="rId15"/>
   </p:sldIdLst>
   <p:sldSz cx="9144000" cy="6858000" type="screen4x3"/>
   <p:notesSz cx="6858000" cy="9144000"/>
@@ -4523,6 +4527,1403 @@
     <p:extLst>
       <p:ext uri="{BB962C8B-B14F-4D97-AF65-F5344CB8AC3E}">
         <p14:creationId xmlns:p14="http://schemas.microsoft.com/office/powerpoint/2010/main" val="2914727233"/>
+      </p:ext>
+    </p:extLst>
+  </p:cSld>
+  <p:clrMapOvr>
+    <a:masterClrMapping/>
+  </p:clrMapOvr>
+</p:sld>
+</file>
+
+<file path=ppt/slides/slide11.xml><?xml version="1.0" encoding="utf-8"?>
+<p:sld xmlns:a="http://schemas.openxmlformats.org/drawingml/2006/main" xmlns:r="http://schemas.openxmlformats.org/officeDocument/2006/relationships" xmlns:p="http://schemas.openxmlformats.org/presentationml/2006/main">
+  <p:cSld>
+    <p:spTree>
+      <p:nvGrpSpPr>
+        <p:cNvPr id="1" name=""/>
+        <p:cNvGrpSpPr/>
+        <p:nvPr/>
+      </p:nvGrpSpPr>
+      <p:grpSpPr>
+        <a:xfrm>
+          <a:off x="0" y="0"/>
+          <a:ext cx="0" cy="0"/>
+          <a:chOff x="0" y="0"/>
+          <a:chExt cx="0" cy="0"/>
+        </a:xfrm>
+      </p:grpSpPr>
+      <p:sp>
+        <p:nvSpPr>
+          <p:cNvPr id="4" name="テキスト ボックス 3"/>
+          <p:cNvSpPr txBox="1"/>
+          <p:nvPr/>
+        </p:nvSpPr>
+        <p:spPr>
+          <a:xfrm>
+            <a:off x="395536" y="476672"/>
+            <a:ext cx="646331" cy="369332"/>
+          </a:xfrm>
+          <a:prstGeom prst="rect">
+            <a:avLst/>
+          </a:prstGeom>
+          <a:noFill/>
+        </p:spPr>
+        <p:txBody>
+          <a:bodyPr wrap="none" rtlCol="0">
+            <a:spAutoFit/>
+          </a:bodyPr>
+          <a:lstStyle/>
+          <a:p>
+            <a:r>
+              <a:rPr kumimoji="1" lang="ja-JP" altLang="en-US" dirty="0" smtClean="0"/>
+              <a:t>入力</a:t>
+            </a:r>
+            <a:endParaRPr kumimoji="1" lang="ja-JP" altLang="en-US" dirty="0"/>
+          </a:p>
+        </p:txBody>
+      </p:sp>
+      <p:cxnSp>
+        <p:nvCxnSpPr>
+          <p:cNvPr id="6" name="直線矢印コネクタ 5"/>
+          <p:cNvCxnSpPr>
+            <a:stCxn id="4" idx="3"/>
+            <a:endCxn id="7" idx="1"/>
+          </p:cNvCxnSpPr>
+          <p:nvPr/>
+        </p:nvCxnSpPr>
+        <p:spPr>
+          <a:xfrm>
+            <a:off x="1041867" y="661338"/>
+            <a:ext cx="361781" cy="422"/>
+          </a:xfrm>
+          <a:prstGeom prst="straightConnector1">
+            <a:avLst/>
+          </a:prstGeom>
+          <a:ln>
+            <a:tailEnd type="triangle" w="lg" len="lg"/>
+          </a:ln>
+        </p:spPr>
+        <p:style>
+          <a:lnRef idx="1">
+            <a:schemeClr val="accent1"/>
+          </a:lnRef>
+          <a:fillRef idx="0">
+            <a:schemeClr val="accent1"/>
+          </a:fillRef>
+          <a:effectRef idx="0">
+            <a:schemeClr val="accent1"/>
+          </a:effectRef>
+          <a:fontRef idx="minor">
+            <a:schemeClr val="tx1"/>
+          </a:fontRef>
+        </p:style>
+      </p:cxnSp>
+      <p:sp>
+        <p:nvSpPr>
+          <p:cNvPr id="7" name="角丸四角形 6"/>
+          <p:cNvSpPr/>
+          <p:nvPr/>
+        </p:nvSpPr>
+        <p:spPr>
+          <a:xfrm>
+            <a:off x="1403648" y="477094"/>
+            <a:ext cx="1224136" cy="369332"/>
+          </a:xfrm>
+          <a:prstGeom prst="roundRect">
+            <a:avLst/>
+          </a:prstGeom>
+          <a:noFill/>
+        </p:spPr>
+        <p:style>
+          <a:lnRef idx="2">
+            <a:schemeClr val="accent1">
+              <a:shade val="50000"/>
+            </a:schemeClr>
+          </a:lnRef>
+          <a:fillRef idx="1">
+            <a:schemeClr val="accent1"/>
+          </a:fillRef>
+          <a:effectRef idx="0">
+            <a:schemeClr val="accent1"/>
+          </a:effectRef>
+          <a:fontRef idx="minor">
+            <a:schemeClr val="lt1"/>
+          </a:fontRef>
+        </p:style>
+        <p:txBody>
+          <a:bodyPr rtlCol="0" anchor="ctr"/>
+          <a:lstStyle/>
+          <a:p>
+            <a:pPr algn="ctr"/>
+            <a:r>
+              <a:rPr kumimoji="1" lang="ja-JP" altLang="en-US" dirty="0" smtClean="0">
+                <a:solidFill>
+                  <a:schemeClr val="tx1"/>
+                </a:solidFill>
+              </a:rPr>
+              <a:t>検証</a:t>
+            </a:r>
+            <a:endParaRPr kumimoji="1" lang="ja-JP" altLang="en-US" dirty="0"/>
+          </a:p>
+        </p:txBody>
+      </p:sp>
+      <p:cxnSp>
+        <p:nvCxnSpPr>
+          <p:cNvPr id="11" name="直線矢印コネクタ 10"/>
+          <p:cNvCxnSpPr>
+            <a:stCxn id="7" idx="3"/>
+          </p:cNvCxnSpPr>
+          <p:nvPr/>
+        </p:nvCxnSpPr>
+        <p:spPr>
+          <a:xfrm flipV="1">
+            <a:off x="2627784" y="661338"/>
+            <a:ext cx="987544" cy="422"/>
+          </a:xfrm>
+          <a:prstGeom prst="straightConnector1">
+            <a:avLst/>
+          </a:prstGeom>
+          <a:ln w="19050">
+            <a:solidFill>
+              <a:srgbClr val="00B050"/>
+            </a:solidFill>
+            <a:tailEnd type="triangle" w="lg" len="lg"/>
+          </a:ln>
+        </p:spPr>
+        <p:style>
+          <a:lnRef idx="1">
+            <a:schemeClr val="accent1"/>
+          </a:lnRef>
+          <a:fillRef idx="0">
+            <a:schemeClr val="accent1"/>
+          </a:fillRef>
+          <a:effectRef idx="0">
+            <a:schemeClr val="accent1"/>
+          </a:effectRef>
+          <a:fontRef idx="minor">
+            <a:schemeClr val="tx1"/>
+          </a:fontRef>
+        </p:style>
+      </p:cxnSp>
+      <p:cxnSp>
+        <p:nvCxnSpPr>
+          <p:cNvPr id="28" name="直線矢印コネクタ 27"/>
+          <p:cNvCxnSpPr>
+            <a:stCxn id="7" idx="2"/>
+          </p:cNvCxnSpPr>
+          <p:nvPr/>
+        </p:nvCxnSpPr>
+        <p:spPr>
+          <a:xfrm rot="16200000" flipH="1">
+            <a:off x="2724747" y="137395"/>
+            <a:ext cx="181550" cy="1599612"/>
+          </a:xfrm>
+          <a:prstGeom prst="curvedConnector2">
+            <a:avLst/>
+          </a:prstGeom>
+          <a:ln w="19050">
+            <a:solidFill>
+              <a:srgbClr val="FF0000"/>
+            </a:solidFill>
+            <a:tailEnd type="triangle" w="lg" len="lg"/>
+          </a:ln>
+        </p:spPr>
+        <p:style>
+          <a:lnRef idx="1">
+            <a:schemeClr val="accent1"/>
+          </a:lnRef>
+          <a:fillRef idx="0">
+            <a:schemeClr val="accent1"/>
+          </a:fillRef>
+          <a:effectRef idx="0">
+            <a:schemeClr val="accent1"/>
+          </a:effectRef>
+          <a:fontRef idx="minor">
+            <a:schemeClr val="tx1"/>
+          </a:fontRef>
+        </p:style>
+      </p:cxnSp>
+      <p:sp>
+        <p:nvSpPr>
+          <p:cNvPr id="38" name="テキスト ボックス 37"/>
+          <p:cNvSpPr txBox="1"/>
+          <p:nvPr/>
+        </p:nvSpPr>
+        <p:spPr>
+          <a:xfrm>
+            <a:off x="2798390" y="1044081"/>
+            <a:ext cx="646331" cy="369332"/>
+          </a:xfrm>
+          <a:prstGeom prst="rect">
+            <a:avLst/>
+          </a:prstGeom>
+          <a:noFill/>
+        </p:spPr>
+        <p:txBody>
+          <a:bodyPr wrap="none" rtlCol="0">
+            <a:spAutoFit/>
+          </a:bodyPr>
+          <a:lstStyle/>
+          <a:p>
+            <a:r>
+              <a:rPr kumimoji="1" lang="ja-JP" altLang="en-US" dirty="0" smtClean="0"/>
+              <a:t>失敗</a:t>
+            </a:r>
+            <a:endParaRPr kumimoji="1" lang="ja-JP" altLang="en-US" dirty="0"/>
+          </a:p>
+        </p:txBody>
+      </p:sp>
+      <p:sp>
+        <p:nvSpPr>
+          <p:cNvPr id="22" name="テキスト ボックス 21"/>
+          <p:cNvSpPr txBox="1"/>
+          <p:nvPr/>
+        </p:nvSpPr>
+        <p:spPr>
+          <a:xfrm>
+            <a:off x="2798390" y="288009"/>
+            <a:ext cx="646331" cy="369332"/>
+          </a:xfrm>
+          <a:prstGeom prst="rect">
+            <a:avLst/>
+          </a:prstGeom>
+          <a:noFill/>
+        </p:spPr>
+        <p:txBody>
+          <a:bodyPr wrap="none" rtlCol="0">
+            <a:spAutoFit/>
+          </a:bodyPr>
+          <a:lstStyle/>
+          <a:p>
+            <a:r>
+              <a:rPr kumimoji="1" lang="ja-JP" altLang="en-US" dirty="0" smtClean="0"/>
+              <a:t>成功</a:t>
+            </a:r>
+            <a:endParaRPr kumimoji="1" lang="ja-JP" altLang="en-US" dirty="0"/>
+          </a:p>
+        </p:txBody>
+      </p:sp>
+      <p:sp>
+        <p:nvSpPr>
+          <p:cNvPr id="19" name="テキスト ボックス 18"/>
+          <p:cNvSpPr txBox="1"/>
+          <p:nvPr/>
+        </p:nvSpPr>
+        <p:spPr>
+          <a:xfrm>
+            <a:off x="3707904" y="674749"/>
+            <a:ext cx="646331" cy="369332"/>
+          </a:xfrm>
+          <a:prstGeom prst="rect">
+            <a:avLst/>
+          </a:prstGeom>
+          <a:noFill/>
+        </p:spPr>
+        <p:txBody>
+          <a:bodyPr wrap="none" rtlCol="0">
+            <a:spAutoFit/>
+          </a:bodyPr>
+          <a:lstStyle/>
+          <a:p>
+            <a:r>
+              <a:rPr kumimoji="1" lang="ja-JP" altLang="en-US" dirty="0" smtClean="0"/>
+              <a:t>出力</a:t>
+            </a:r>
+            <a:endParaRPr kumimoji="1" lang="ja-JP" altLang="en-US" dirty="0"/>
+          </a:p>
+        </p:txBody>
+      </p:sp>
+    </p:spTree>
+    <p:extLst>
+      <p:ext uri="{BB962C8B-B14F-4D97-AF65-F5344CB8AC3E}">
+        <p14:creationId xmlns:p14="http://schemas.microsoft.com/office/powerpoint/2010/main" val="2307027376"/>
+      </p:ext>
+    </p:extLst>
+  </p:cSld>
+  <p:clrMapOvr>
+    <a:masterClrMapping/>
+  </p:clrMapOvr>
+</p:sld>
+</file>
+
+<file path=ppt/slides/slide12.xml><?xml version="1.0" encoding="utf-8"?>
+<p:sld xmlns:a="http://schemas.openxmlformats.org/drawingml/2006/main" xmlns:r="http://schemas.openxmlformats.org/officeDocument/2006/relationships" xmlns:p="http://schemas.openxmlformats.org/presentationml/2006/main">
+  <p:cSld>
+    <p:spTree>
+      <p:nvGrpSpPr>
+        <p:cNvPr id="1" name=""/>
+        <p:cNvGrpSpPr/>
+        <p:nvPr/>
+      </p:nvGrpSpPr>
+      <p:grpSpPr>
+        <a:xfrm>
+          <a:off x="0" y="0"/>
+          <a:ext cx="0" cy="0"/>
+          <a:chOff x="0" y="0"/>
+          <a:chExt cx="0" cy="0"/>
+        </a:xfrm>
+      </p:grpSpPr>
+      <p:sp>
+        <p:nvSpPr>
+          <p:cNvPr id="4" name="テキスト ボックス 3"/>
+          <p:cNvSpPr txBox="1"/>
+          <p:nvPr/>
+        </p:nvSpPr>
+        <p:spPr>
+          <a:xfrm>
+            <a:off x="395536" y="476672"/>
+            <a:ext cx="646331" cy="369332"/>
+          </a:xfrm>
+          <a:prstGeom prst="rect">
+            <a:avLst/>
+          </a:prstGeom>
+          <a:noFill/>
+        </p:spPr>
+        <p:txBody>
+          <a:bodyPr wrap="none" rtlCol="0">
+            <a:spAutoFit/>
+          </a:bodyPr>
+          <a:lstStyle/>
+          <a:p>
+            <a:r>
+              <a:rPr kumimoji="1" lang="ja-JP" altLang="en-US" dirty="0" smtClean="0"/>
+              <a:t>入力</a:t>
+            </a:r>
+            <a:endParaRPr kumimoji="1" lang="ja-JP" altLang="en-US" dirty="0"/>
+          </a:p>
+        </p:txBody>
+      </p:sp>
+      <p:cxnSp>
+        <p:nvCxnSpPr>
+          <p:cNvPr id="6" name="直線矢印コネクタ 5"/>
+          <p:cNvCxnSpPr>
+            <a:stCxn id="4" idx="3"/>
+            <a:endCxn id="7" idx="1"/>
+          </p:cNvCxnSpPr>
+          <p:nvPr/>
+        </p:nvCxnSpPr>
+        <p:spPr>
+          <a:xfrm>
+            <a:off x="1041867" y="661338"/>
+            <a:ext cx="361781" cy="422"/>
+          </a:xfrm>
+          <a:prstGeom prst="straightConnector1">
+            <a:avLst/>
+          </a:prstGeom>
+          <a:ln>
+            <a:tailEnd type="triangle" w="lg" len="lg"/>
+          </a:ln>
+        </p:spPr>
+        <p:style>
+          <a:lnRef idx="1">
+            <a:schemeClr val="accent1"/>
+          </a:lnRef>
+          <a:fillRef idx="0">
+            <a:schemeClr val="accent1"/>
+          </a:fillRef>
+          <a:effectRef idx="0">
+            <a:schemeClr val="accent1"/>
+          </a:effectRef>
+          <a:fontRef idx="minor">
+            <a:schemeClr val="tx1"/>
+          </a:fontRef>
+        </p:style>
+      </p:cxnSp>
+      <p:sp>
+        <p:nvSpPr>
+          <p:cNvPr id="7" name="角丸四角形 6"/>
+          <p:cNvSpPr/>
+          <p:nvPr/>
+        </p:nvSpPr>
+        <p:spPr>
+          <a:xfrm>
+            <a:off x="1403648" y="477094"/>
+            <a:ext cx="1224136" cy="369332"/>
+          </a:xfrm>
+          <a:prstGeom prst="roundRect">
+            <a:avLst/>
+          </a:prstGeom>
+          <a:noFill/>
+        </p:spPr>
+        <p:style>
+          <a:lnRef idx="2">
+            <a:schemeClr val="accent1">
+              <a:shade val="50000"/>
+            </a:schemeClr>
+          </a:lnRef>
+          <a:fillRef idx="1">
+            <a:schemeClr val="accent1"/>
+          </a:fillRef>
+          <a:effectRef idx="0">
+            <a:schemeClr val="accent1"/>
+          </a:effectRef>
+          <a:fontRef idx="minor">
+            <a:schemeClr val="lt1"/>
+          </a:fontRef>
+        </p:style>
+        <p:txBody>
+          <a:bodyPr rtlCol="0" anchor="ctr"/>
+          <a:lstStyle/>
+          <a:p>
+            <a:pPr algn="ctr"/>
+            <a:r>
+              <a:rPr kumimoji="1" lang="ja-JP" altLang="en-US" dirty="0" smtClean="0">
+                <a:solidFill>
+                  <a:schemeClr val="tx1"/>
+                </a:solidFill>
+              </a:rPr>
+              <a:t>検証</a:t>
+            </a:r>
+            <a:endParaRPr kumimoji="1" lang="ja-JP" altLang="en-US" dirty="0"/>
+          </a:p>
+        </p:txBody>
+      </p:sp>
+      <p:sp>
+        <p:nvSpPr>
+          <p:cNvPr id="38" name="テキスト ボックス 37"/>
+          <p:cNvSpPr txBox="1"/>
+          <p:nvPr/>
+        </p:nvSpPr>
+        <p:spPr>
+          <a:xfrm>
+            <a:off x="2798390" y="753882"/>
+            <a:ext cx="646331" cy="369332"/>
+          </a:xfrm>
+          <a:prstGeom prst="rect">
+            <a:avLst/>
+          </a:prstGeom>
+          <a:noFill/>
+        </p:spPr>
+        <p:txBody>
+          <a:bodyPr wrap="none" rtlCol="0">
+            <a:spAutoFit/>
+          </a:bodyPr>
+          <a:lstStyle/>
+          <a:p>
+            <a:r>
+              <a:rPr kumimoji="1" lang="ja-JP" altLang="en-US" dirty="0" smtClean="0"/>
+              <a:t>失敗</a:t>
+            </a:r>
+            <a:endParaRPr kumimoji="1" lang="ja-JP" altLang="en-US" dirty="0"/>
+          </a:p>
+        </p:txBody>
+      </p:sp>
+      <p:sp>
+        <p:nvSpPr>
+          <p:cNvPr id="22" name="テキスト ボックス 21"/>
+          <p:cNvSpPr txBox="1"/>
+          <p:nvPr/>
+        </p:nvSpPr>
+        <p:spPr>
+          <a:xfrm>
+            <a:off x="2798390" y="199884"/>
+            <a:ext cx="646331" cy="369332"/>
+          </a:xfrm>
+          <a:prstGeom prst="rect">
+            <a:avLst/>
+          </a:prstGeom>
+          <a:noFill/>
+        </p:spPr>
+        <p:txBody>
+          <a:bodyPr wrap="none" rtlCol="0">
+            <a:spAutoFit/>
+          </a:bodyPr>
+          <a:lstStyle/>
+          <a:p>
+            <a:r>
+              <a:rPr kumimoji="1" lang="ja-JP" altLang="en-US" dirty="0" smtClean="0"/>
+              <a:t>成功</a:t>
+            </a:r>
+            <a:endParaRPr kumimoji="1" lang="ja-JP" altLang="en-US" dirty="0"/>
+          </a:p>
+        </p:txBody>
+      </p:sp>
+      <p:sp>
+        <p:nvSpPr>
+          <p:cNvPr id="19" name="テキスト ボックス 18"/>
+          <p:cNvSpPr txBox="1"/>
+          <p:nvPr/>
+        </p:nvSpPr>
+        <p:spPr>
+          <a:xfrm>
+            <a:off x="3707904" y="499911"/>
+            <a:ext cx="646331" cy="369332"/>
+          </a:xfrm>
+          <a:prstGeom prst="rect">
+            <a:avLst/>
+          </a:prstGeom>
+          <a:noFill/>
+        </p:spPr>
+        <p:txBody>
+          <a:bodyPr wrap="none" rtlCol="0">
+            <a:spAutoFit/>
+          </a:bodyPr>
+          <a:lstStyle/>
+          <a:p>
+            <a:r>
+              <a:rPr kumimoji="1" lang="ja-JP" altLang="en-US" dirty="0" smtClean="0"/>
+              <a:t>出力</a:t>
+            </a:r>
+            <a:endParaRPr kumimoji="1" lang="ja-JP" altLang="en-US" dirty="0"/>
+          </a:p>
+        </p:txBody>
+      </p:sp>
+      <p:sp>
+        <p:nvSpPr>
+          <p:cNvPr id="2" name="正方形/長方形 1"/>
+          <p:cNvSpPr/>
+          <p:nvPr/>
+        </p:nvSpPr>
+        <p:spPr>
+          <a:xfrm>
+            <a:off x="2627784" y="569216"/>
+            <a:ext cx="936104" cy="92122"/>
+          </a:xfrm>
+          <a:prstGeom prst="rect">
+            <a:avLst/>
+          </a:prstGeom>
+          <a:solidFill>
+            <a:srgbClr val="00B050"/>
+          </a:solidFill>
+        </p:spPr>
+        <p:style>
+          <a:lnRef idx="2">
+            <a:schemeClr val="accent1">
+              <a:shade val="50000"/>
+            </a:schemeClr>
+          </a:lnRef>
+          <a:fillRef idx="1">
+            <a:schemeClr val="accent1"/>
+          </a:fillRef>
+          <a:effectRef idx="0">
+            <a:schemeClr val="accent1"/>
+          </a:effectRef>
+          <a:fontRef idx="minor">
+            <a:schemeClr val="lt1"/>
+          </a:fontRef>
+        </p:style>
+        <p:txBody>
+          <a:bodyPr rtlCol="0" anchor="ctr"/>
+          <a:lstStyle/>
+          <a:p>
+            <a:pPr algn="ctr"/>
+            <a:endParaRPr kumimoji="1" lang="ja-JP" altLang="en-US"/>
+          </a:p>
+        </p:txBody>
+      </p:sp>
+      <p:sp>
+        <p:nvSpPr>
+          <p:cNvPr id="12" name="正方形/長方形 11"/>
+          <p:cNvSpPr/>
+          <p:nvPr/>
+        </p:nvSpPr>
+        <p:spPr>
+          <a:xfrm>
+            <a:off x="2627784" y="661760"/>
+            <a:ext cx="936104" cy="92122"/>
+          </a:xfrm>
+          <a:prstGeom prst="rect">
+            <a:avLst/>
+          </a:prstGeom>
+          <a:solidFill>
+            <a:srgbClr val="FF0000"/>
+          </a:solidFill>
+        </p:spPr>
+        <p:style>
+          <a:lnRef idx="2">
+            <a:schemeClr val="accent1">
+              <a:shade val="50000"/>
+            </a:schemeClr>
+          </a:lnRef>
+          <a:fillRef idx="1">
+            <a:schemeClr val="accent1"/>
+          </a:fillRef>
+          <a:effectRef idx="0">
+            <a:schemeClr val="accent1"/>
+          </a:effectRef>
+          <a:fontRef idx="minor">
+            <a:schemeClr val="lt1"/>
+          </a:fontRef>
+        </p:style>
+        <p:txBody>
+          <a:bodyPr rtlCol="0" anchor="ctr"/>
+          <a:lstStyle/>
+          <a:p>
+            <a:pPr algn="ctr"/>
+            <a:endParaRPr kumimoji="1" lang="ja-JP" altLang="en-US"/>
+          </a:p>
+        </p:txBody>
+      </p:sp>
+    </p:spTree>
+    <p:extLst>
+      <p:ext uri="{BB962C8B-B14F-4D97-AF65-F5344CB8AC3E}">
+        <p14:creationId xmlns:p14="http://schemas.microsoft.com/office/powerpoint/2010/main" val="2036930050"/>
+      </p:ext>
+    </p:extLst>
+  </p:cSld>
+  <p:clrMapOvr>
+    <a:masterClrMapping/>
+  </p:clrMapOvr>
+</p:sld>
+</file>
+
+<file path=ppt/slides/slide13.xml><?xml version="1.0" encoding="utf-8"?>
+<p:sld xmlns:a="http://schemas.openxmlformats.org/drawingml/2006/main" xmlns:r="http://schemas.openxmlformats.org/officeDocument/2006/relationships" xmlns:p="http://schemas.openxmlformats.org/presentationml/2006/main">
+  <p:cSld>
+    <p:spTree>
+      <p:nvGrpSpPr>
+        <p:cNvPr id="1" name=""/>
+        <p:cNvGrpSpPr/>
+        <p:nvPr/>
+      </p:nvGrpSpPr>
+      <p:grpSpPr>
+        <a:xfrm>
+          <a:off x="0" y="0"/>
+          <a:ext cx="0" cy="0"/>
+          <a:chOff x="0" y="0"/>
+          <a:chExt cx="0" cy="0"/>
+        </a:xfrm>
+      </p:grpSpPr>
+      <p:sp>
+        <p:nvSpPr>
+          <p:cNvPr id="4" name="テキスト ボックス 3"/>
+          <p:cNvSpPr txBox="1"/>
+          <p:nvPr/>
+        </p:nvSpPr>
+        <p:spPr>
+          <a:xfrm>
+            <a:off x="395536" y="476672"/>
+            <a:ext cx="646331" cy="369332"/>
+          </a:xfrm>
+          <a:prstGeom prst="rect">
+            <a:avLst/>
+          </a:prstGeom>
+          <a:noFill/>
+        </p:spPr>
+        <p:txBody>
+          <a:bodyPr wrap="none" rtlCol="0">
+            <a:spAutoFit/>
+          </a:bodyPr>
+          <a:lstStyle/>
+          <a:p>
+            <a:r>
+              <a:rPr kumimoji="1" lang="ja-JP" altLang="en-US" dirty="0" smtClean="0"/>
+              <a:t>入力</a:t>
+            </a:r>
+            <a:endParaRPr kumimoji="1" lang="ja-JP" altLang="en-US" dirty="0"/>
+          </a:p>
+        </p:txBody>
+      </p:sp>
+      <p:cxnSp>
+        <p:nvCxnSpPr>
+          <p:cNvPr id="6" name="直線矢印コネクタ 5"/>
+          <p:cNvCxnSpPr>
+            <a:stCxn id="4" idx="3"/>
+            <a:endCxn id="7" idx="1"/>
+          </p:cNvCxnSpPr>
+          <p:nvPr/>
+        </p:nvCxnSpPr>
+        <p:spPr>
+          <a:xfrm>
+            <a:off x="1041867" y="661338"/>
+            <a:ext cx="361781" cy="422"/>
+          </a:xfrm>
+          <a:prstGeom prst="straightConnector1">
+            <a:avLst/>
+          </a:prstGeom>
+          <a:ln>
+            <a:tailEnd type="triangle" w="lg" len="lg"/>
+          </a:ln>
+        </p:spPr>
+        <p:style>
+          <a:lnRef idx="1">
+            <a:schemeClr val="accent1"/>
+          </a:lnRef>
+          <a:fillRef idx="0">
+            <a:schemeClr val="accent1"/>
+          </a:fillRef>
+          <a:effectRef idx="0">
+            <a:schemeClr val="accent1"/>
+          </a:effectRef>
+          <a:fontRef idx="minor">
+            <a:schemeClr val="tx1"/>
+          </a:fontRef>
+        </p:style>
+      </p:cxnSp>
+      <p:sp>
+        <p:nvSpPr>
+          <p:cNvPr id="7" name="角丸四角形 6"/>
+          <p:cNvSpPr/>
+          <p:nvPr/>
+        </p:nvSpPr>
+        <p:spPr>
+          <a:xfrm>
+            <a:off x="1403648" y="477094"/>
+            <a:ext cx="1224136" cy="369332"/>
+          </a:xfrm>
+          <a:prstGeom prst="roundRect">
+            <a:avLst/>
+          </a:prstGeom>
+          <a:noFill/>
+        </p:spPr>
+        <p:style>
+          <a:lnRef idx="2">
+            <a:schemeClr val="accent1">
+              <a:shade val="50000"/>
+            </a:schemeClr>
+          </a:lnRef>
+          <a:fillRef idx="1">
+            <a:schemeClr val="accent1"/>
+          </a:fillRef>
+          <a:effectRef idx="0">
+            <a:schemeClr val="accent1"/>
+          </a:effectRef>
+          <a:fontRef idx="minor">
+            <a:schemeClr val="lt1"/>
+          </a:fontRef>
+        </p:style>
+        <p:txBody>
+          <a:bodyPr rtlCol="0" anchor="ctr"/>
+          <a:lstStyle/>
+          <a:p>
+            <a:pPr algn="ctr"/>
+            <a:r>
+              <a:rPr kumimoji="1" lang="ja-JP" altLang="en-US" dirty="0" smtClean="0">
+                <a:solidFill>
+                  <a:schemeClr val="tx1"/>
+                </a:solidFill>
+              </a:rPr>
+              <a:t>検証</a:t>
+            </a:r>
+            <a:endParaRPr kumimoji="1" lang="ja-JP" altLang="en-US" dirty="0"/>
+          </a:p>
+        </p:txBody>
+      </p:sp>
+      <p:sp>
+        <p:nvSpPr>
+          <p:cNvPr id="38" name="テキスト ボックス 37"/>
+          <p:cNvSpPr txBox="1"/>
+          <p:nvPr/>
+        </p:nvSpPr>
+        <p:spPr>
+          <a:xfrm>
+            <a:off x="2754404" y="753882"/>
+            <a:ext cx="646331" cy="369332"/>
+          </a:xfrm>
+          <a:prstGeom prst="rect">
+            <a:avLst/>
+          </a:prstGeom>
+          <a:noFill/>
+        </p:spPr>
+        <p:txBody>
+          <a:bodyPr wrap="none" rtlCol="0">
+            <a:spAutoFit/>
+          </a:bodyPr>
+          <a:lstStyle/>
+          <a:p>
+            <a:r>
+              <a:rPr kumimoji="1" lang="ja-JP" altLang="en-US" dirty="0" smtClean="0"/>
+              <a:t>失敗</a:t>
+            </a:r>
+            <a:endParaRPr kumimoji="1" lang="ja-JP" altLang="en-US" dirty="0"/>
+          </a:p>
+        </p:txBody>
+      </p:sp>
+      <p:sp>
+        <p:nvSpPr>
+          <p:cNvPr id="22" name="テキスト ボックス 21"/>
+          <p:cNvSpPr txBox="1"/>
+          <p:nvPr/>
+        </p:nvSpPr>
+        <p:spPr>
+          <a:xfrm>
+            <a:off x="2772670" y="199884"/>
+            <a:ext cx="646331" cy="369332"/>
+          </a:xfrm>
+          <a:prstGeom prst="rect">
+            <a:avLst/>
+          </a:prstGeom>
+          <a:noFill/>
+        </p:spPr>
+        <p:txBody>
+          <a:bodyPr wrap="none" rtlCol="0">
+            <a:spAutoFit/>
+          </a:bodyPr>
+          <a:lstStyle/>
+          <a:p>
+            <a:r>
+              <a:rPr kumimoji="1" lang="ja-JP" altLang="en-US" dirty="0" smtClean="0"/>
+              <a:t>成功</a:t>
+            </a:r>
+            <a:endParaRPr kumimoji="1" lang="ja-JP" altLang="en-US" dirty="0"/>
+          </a:p>
+        </p:txBody>
+      </p:sp>
+      <p:sp>
+        <p:nvSpPr>
+          <p:cNvPr id="10" name="角丸四角形 9"/>
+          <p:cNvSpPr/>
+          <p:nvPr/>
+        </p:nvSpPr>
+        <p:spPr>
+          <a:xfrm>
+            <a:off x="4932040" y="472675"/>
+            <a:ext cx="1224136" cy="369332"/>
+          </a:xfrm>
+          <a:prstGeom prst="roundRect">
+            <a:avLst/>
+          </a:prstGeom>
+          <a:noFill/>
+        </p:spPr>
+        <p:style>
+          <a:lnRef idx="2">
+            <a:schemeClr val="accent1">
+              <a:shade val="50000"/>
+            </a:schemeClr>
+          </a:lnRef>
+          <a:fillRef idx="1">
+            <a:schemeClr val="accent1"/>
+          </a:fillRef>
+          <a:effectRef idx="0">
+            <a:schemeClr val="accent1"/>
+          </a:effectRef>
+          <a:fontRef idx="minor">
+            <a:schemeClr val="lt1"/>
+          </a:fontRef>
+        </p:style>
+        <p:txBody>
+          <a:bodyPr rtlCol="0" anchor="ctr"/>
+          <a:lstStyle/>
+          <a:p>
+            <a:pPr algn="ctr"/>
+            <a:r>
+              <a:rPr lang="ja-JP" altLang="en-US" dirty="0">
+                <a:solidFill>
+                  <a:schemeClr val="tx1"/>
+                </a:solidFill>
+              </a:rPr>
+              <a:t>更新</a:t>
+            </a:r>
+            <a:endParaRPr kumimoji="1" lang="ja-JP" altLang="en-US" dirty="0"/>
+          </a:p>
+        </p:txBody>
+      </p:sp>
+      <p:sp>
+        <p:nvSpPr>
+          <p:cNvPr id="17" name="正方形/長方形 16"/>
+          <p:cNvSpPr/>
+          <p:nvPr/>
+        </p:nvSpPr>
+        <p:spPr>
+          <a:xfrm>
+            <a:off x="2627784" y="569216"/>
+            <a:ext cx="936104" cy="92122"/>
+          </a:xfrm>
+          <a:prstGeom prst="rect">
+            <a:avLst/>
+          </a:prstGeom>
+          <a:solidFill>
+            <a:srgbClr val="00B050"/>
+          </a:solidFill>
+        </p:spPr>
+        <p:style>
+          <a:lnRef idx="2">
+            <a:schemeClr val="accent1">
+              <a:shade val="50000"/>
+            </a:schemeClr>
+          </a:lnRef>
+          <a:fillRef idx="1">
+            <a:schemeClr val="accent1"/>
+          </a:fillRef>
+          <a:effectRef idx="0">
+            <a:schemeClr val="accent1"/>
+          </a:effectRef>
+          <a:fontRef idx="minor">
+            <a:schemeClr val="lt1"/>
+          </a:fontRef>
+        </p:style>
+        <p:txBody>
+          <a:bodyPr rtlCol="0" anchor="ctr"/>
+          <a:lstStyle/>
+          <a:p>
+            <a:pPr algn="ctr"/>
+            <a:endParaRPr kumimoji="1" lang="ja-JP" altLang="en-US"/>
+          </a:p>
+        </p:txBody>
+      </p:sp>
+      <p:sp>
+        <p:nvSpPr>
+          <p:cNvPr id="18" name="正方形/長方形 17"/>
+          <p:cNvSpPr/>
+          <p:nvPr/>
+        </p:nvSpPr>
+        <p:spPr>
+          <a:xfrm>
+            <a:off x="2627784" y="661760"/>
+            <a:ext cx="936104" cy="92122"/>
+          </a:xfrm>
+          <a:prstGeom prst="rect">
+            <a:avLst/>
+          </a:prstGeom>
+          <a:solidFill>
+            <a:srgbClr val="FF0000"/>
+          </a:solidFill>
+        </p:spPr>
+        <p:style>
+          <a:lnRef idx="2">
+            <a:schemeClr val="accent1">
+              <a:shade val="50000"/>
+            </a:schemeClr>
+          </a:lnRef>
+          <a:fillRef idx="1">
+            <a:schemeClr val="accent1"/>
+          </a:fillRef>
+          <a:effectRef idx="0">
+            <a:schemeClr val="accent1"/>
+          </a:effectRef>
+          <a:fontRef idx="minor">
+            <a:schemeClr val="lt1"/>
+          </a:fontRef>
+        </p:style>
+        <p:txBody>
+          <a:bodyPr rtlCol="0" anchor="ctr"/>
+          <a:lstStyle/>
+          <a:p>
+            <a:pPr algn="ctr"/>
+            <a:endParaRPr kumimoji="1" lang="ja-JP" altLang="en-US"/>
+          </a:p>
+        </p:txBody>
+      </p:sp>
+      <p:cxnSp>
+        <p:nvCxnSpPr>
+          <p:cNvPr id="3" name="曲線コネクタ 2"/>
+          <p:cNvCxnSpPr>
+            <a:stCxn id="17" idx="3"/>
+            <a:endCxn id="10" idx="1"/>
+          </p:cNvCxnSpPr>
+          <p:nvPr/>
+        </p:nvCxnSpPr>
+        <p:spPr>
+          <a:xfrm>
+            <a:off x="3563888" y="615277"/>
+            <a:ext cx="1368152" cy="42064"/>
+          </a:xfrm>
+          <a:prstGeom prst="curvedConnector3">
+            <a:avLst/>
+          </a:prstGeom>
+          <a:ln>
+            <a:tailEnd type="arrow"/>
+          </a:ln>
+        </p:spPr>
+        <p:style>
+          <a:lnRef idx="1">
+            <a:schemeClr val="accent1"/>
+          </a:lnRef>
+          <a:fillRef idx="0">
+            <a:schemeClr val="accent1"/>
+          </a:fillRef>
+          <a:effectRef idx="0">
+            <a:schemeClr val="accent1"/>
+          </a:effectRef>
+          <a:fontRef idx="minor">
+            <a:schemeClr val="tx1"/>
+          </a:fontRef>
+        </p:style>
+      </p:cxnSp>
+      <p:cxnSp>
+        <p:nvCxnSpPr>
+          <p:cNvPr id="8" name="曲線コネクタ 7"/>
+          <p:cNvCxnSpPr>
+            <a:stCxn id="18" idx="3"/>
+          </p:cNvCxnSpPr>
+          <p:nvPr/>
+        </p:nvCxnSpPr>
+        <p:spPr>
+          <a:xfrm>
+            <a:off x="3563888" y="707821"/>
+            <a:ext cx="2880320" cy="560939"/>
+          </a:xfrm>
+          <a:prstGeom prst="curvedConnector3">
+            <a:avLst/>
+          </a:prstGeom>
+          <a:ln>
+            <a:tailEnd type="arrow"/>
+          </a:ln>
+        </p:spPr>
+        <p:style>
+          <a:lnRef idx="1">
+            <a:schemeClr val="accent1"/>
+          </a:lnRef>
+          <a:fillRef idx="0">
+            <a:schemeClr val="accent1"/>
+          </a:fillRef>
+          <a:effectRef idx="0">
+            <a:schemeClr val="accent1"/>
+          </a:effectRef>
+          <a:fontRef idx="minor">
+            <a:schemeClr val="tx1"/>
+          </a:fontRef>
+        </p:style>
+      </p:cxnSp>
+      <p:sp>
+        <p:nvSpPr>
+          <p:cNvPr id="23" name="正方形/長方形 22"/>
+          <p:cNvSpPr/>
+          <p:nvPr/>
+        </p:nvSpPr>
+        <p:spPr>
+          <a:xfrm>
+            <a:off x="6156176" y="582513"/>
+            <a:ext cx="936104" cy="92122"/>
+          </a:xfrm>
+          <a:prstGeom prst="rect">
+            <a:avLst/>
+          </a:prstGeom>
+          <a:solidFill>
+            <a:srgbClr val="00B050"/>
+          </a:solidFill>
+        </p:spPr>
+        <p:style>
+          <a:lnRef idx="2">
+            <a:schemeClr val="accent1">
+              <a:shade val="50000"/>
+            </a:schemeClr>
+          </a:lnRef>
+          <a:fillRef idx="1">
+            <a:schemeClr val="accent1"/>
+          </a:fillRef>
+          <a:effectRef idx="0">
+            <a:schemeClr val="accent1"/>
+          </a:effectRef>
+          <a:fontRef idx="minor">
+            <a:schemeClr val="lt1"/>
+          </a:fontRef>
+        </p:style>
+        <p:txBody>
+          <a:bodyPr rtlCol="0" anchor="ctr"/>
+          <a:lstStyle/>
+          <a:p>
+            <a:pPr algn="ctr"/>
+            <a:endParaRPr kumimoji="1" lang="ja-JP" altLang="en-US"/>
+          </a:p>
+        </p:txBody>
+      </p:sp>
+      <p:sp>
+        <p:nvSpPr>
+          <p:cNvPr id="24" name="正方形/長方形 23"/>
+          <p:cNvSpPr/>
+          <p:nvPr/>
+        </p:nvSpPr>
+        <p:spPr>
+          <a:xfrm>
+            <a:off x="6156176" y="675057"/>
+            <a:ext cx="936104" cy="92122"/>
+          </a:xfrm>
+          <a:prstGeom prst="rect">
+            <a:avLst/>
+          </a:prstGeom>
+          <a:solidFill>
+            <a:srgbClr val="FF0000"/>
+          </a:solidFill>
+        </p:spPr>
+        <p:style>
+          <a:lnRef idx="2">
+            <a:schemeClr val="accent1">
+              <a:shade val="50000"/>
+            </a:schemeClr>
+          </a:lnRef>
+          <a:fillRef idx="1">
+            <a:schemeClr val="accent1"/>
+          </a:fillRef>
+          <a:effectRef idx="0">
+            <a:schemeClr val="accent1"/>
+          </a:effectRef>
+          <a:fontRef idx="minor">
+            <a:schemeClr val="lt1"/>
+          </a:fontRef>
+        </p:style>
+        <p:txBody>
+          <a:bodyPr rtlCol="0" anchor="ctr"/>
+          <a:lstStyle/>
+          <a:p>
+            <a:pPr algn="ctr"/>
+            <a:endParaRPr kumimoji="1" lang="ja-JP" altLang="en-US"/>
+          </a:p>
+        </p:txBody>
+      </p:sp>
+      <p:sp>
+        <p:nvSpPr>
+          <p:cNvPr id="20" name="テキスト ボックス 19"/>
+          <p:cNvSpPr txBox="1"/>
+          <p:nvPr/>
+        </p:nvSpPr>
+        <p:spPr>
+          <a:xfrm>
+            <a:off x="3779912" y="266977"/>
+            <a:ext cx="936104" cy="369332"/>
+          </a:xfrm>
+          <a:prstGeom prst="rect">
+            <a:avLst/>
+          </a:prstGeom>
+          <a:noFill/>
+        </p:spPr>
+        <p:txBody>
+          <a:bodyPr wrap="square" rtlCol="0">
+            <a:spAutoFit/>
+          </a:bodyPr>
+          <a:lstStyle/>
+          <a:p>
+            <a:r>
+              <a:rPr kumimoji="1" lang="ja-JP" altLang="en-US" dirty="0" smtClean="0"/>
+              <a:t>成功時</a:t>
+            </a:r>
+            <a:endParaRPr kumimoji="1" lang="ja-JP" altLang="en-US" dirty="0"/>
+          </a:p>
+        </p:txBody>
+      </p:sp>
+      <p:sp>
+        <p:nvSpPr>
+          <p:cNvPr id="26" name="テキスト ボックス 25"/>
+          <p:cNvSpPr txBox="1"/>
+          <p:nvPr/>
+        </p:nvSpPr>
+        <p:spPr>
+          <a:xfrm>
+            <a:off x="4067944" y="881582"/>
+            <a:ext cx="1080120" cy="369332"/>
+          </a:xfrm>
+          <a:prstGeom prst="rect">
+            <a:avLst/>
+          </a:prstGeom>
+          <a:noFill/>
+        </p:spPr>
+        <p:txBody>
+          <a:bodyPr wrap="square" rtlCol="0">
+            <a:spAutoFit/>
+          </a:bodyPr>
+          <a:lstStyle/>
+          <a:p>
+            <a:r>
+              <a:rPr kumimoji="1" lang="ja-JP" altLang="en-US" dirty="0" smtClean="0"/>
+              <a:t>バイパス</a:t>
+            </a:r>
+            <a:endParaRPr kumimoji="1" lang="ja-JP" altLang="en-US" dirty="0"/>
+          </a:p>
+        </p:txBody>
+      </p:sp>
+      <p:sp>
+        <p:nvSpPr>
+          <p:cNvPr id="27" name="テキスト ボックス 26"/>
+          <p:cNvSpPr txBox="1"/>
+          <p:nvPr/>
+        </p:nvSpPr>
+        <p:spPr>
+          <a:xfrm>
+            <a:off x="6282796" y="751836"/>
+            <a:ext cx="646331" cy="369332"/>
+          </a:xfrm>
+          <a:prstGeom prst="rect">
+            <a:avLst/>
+          </a:prstGeom>
+          <a:noFill/>
+        </p:spPr>
+        <p:txBody>
+          <a:bodyPr wrap="none" rtlCol="0">
+            <a:spAutoFit/>
+          </a:bodyPr>
+          <a:lstStyle/>
+          <a:p>
+            <a:r>
+              <a:rPr kumimoji="1" lang="ja-JP" altLang="en-US" dirty="0" smtClean="0"/>
+              <a:t>失敗</a:t>
+            </a:r>
+            <a:endParaRPr kumimoji="1" lang="ja-JP" altLang="en-US" dirty="0"/>
+          </a:p>
+        </p:txBody>
+      </p:sp>
+      <p:sp>
+        <p:nvSpPr>
+          <p:cNvPr id="29" name="テキスト ボックス 28"/>
+          <p:cNvSpPr txBox="1"/>
+          <p:nvPr/>
+        </p:nvSpPr>
+        <p:spPr>
+          <a:xfrm>
+            <a:off x="6301062" y="197838"/>
+            <a:ext cx="646331" cy="369332"/>
+          </a:xfrm>
+          <a:prstGeom prst="rect">
+            <a:avLst/>
+          </a:prstGeom>
+          <a:noFill/>
+        </p:spPr>
+        <p:txBody>
+          <a:bodyPr wrap="none" rtlCol="0">
+            <a:spAutoFit/>
+          </a:bodyPr>
+          <a:lstStyle/>
+          <a:p>
+            <a:r>
+              <a:rPr kumimoji="1" lang="ja-JP" altLang="en-US" dirty="0" smtClean="0"/>
+              <a:t>成功</a:t>
+            </a:r>
+            <a:endParaRPr kumimoji="1" lang="ja-JP" altLang="en-US" dirty="0"/>
+          </a:p>
+        </p:txBody>
+      </p:sp>
+    </p:spTree>
+    <p:extLst>
+      <p:ext uri="{BB962C8B-B14F-4D97-AF65-F5344CB8AC3E}">
+        <p14:creationId xmlns:p14="http://schemas.microsoft.com/office/powerpoint/2010/main" val="1452514885"/>
+      </p:ext>
+    </p:extLst>
+  </p:cSld>
+  <p:clrMapOvr>
+    <a:masterClrMapping/>
+  </p:clrMapOvr>
+</p:sld>
+</file>
+
+<file path=ppt/slides/slide14.xml><?xml version="1.0" encoding="utf-8"?>
+<p:sld xmlns:a="http://schemas.openxmlformats.org/drawingml/2006/main" xmlns:r="http://schemas.openxmlformats.org/officeDocument/2006/relationships" xmlns:p="http://schemas.openxmlformats.org/presentationml/2006/main">
+  <p:cSld>
+    <p:spTree>
+      <p:nvGrpSpPr>
+        <p:cNvPr id="1" name=""/>
+        <p:cNvGrpSpPr/>
+        <p:nvPr/>
+      </p:nvGrpSpPr>
+      <p:grpSpPr>
+        <a:xfrm>
+          <a:off x="0" y="0"/>
+          <a:ext cx="0" cy="0"/>
+          <a:chOff x="0" y="0"/>
+          <a:chExt cx="0" cy="0"/>
+        </a:xfrm>
+      </p:grpSpPr>
+      <p:pic>
+        <p:nvPicPr>
+          <p:cNvPr id="1026" name="Picture 2"/>
+          <p:cNvPicPr>
+            <a:picLocks noChangeAspect="1" noChangeArrowheads="1"/>
+          </p:cNvPicPr>
+          <p:nvPr/>
+        </p:nvPicPr>
+        <p:blipFill>
+          <a:blip r:embed="rId2">
+            <a:extLst>
+              <a:ext uri="{28A0092B-C50C-407E-A947-70E740481C1C}">
+                <a14:useLocalDpi xmlns:a14="http://schemas.microsoft.com/office/drawing/2010/main" val="0"/>
+              </a:ext>
+            </a:extLst>
+          </a:blip>
+          <a:srcRect/>
+          <a:stretch>
+            <a:fillRect/>
+          </a:stretch>
+        </p:blipFill>
+        <p:spPr bwMode="auto">
+          <a:xfrm>
+            <a:off x="179512" y="188640"/>
+            <a:ext cx="2857500" cy="895350"/>
+          </a:xfrm>
+          <a:prstGeom prst="rect">
+            <a:avLst/>
+          </a:prstGeom>
+          <a:noFill/>
+          <a:ln>
+            <a:noFill/>
+          </a:ln>
+          <a:extLst>
+            <a:ext uri="{909E8E84-426E-40DD-AFC4-6F175D3DCCD1}">
+              <a14:hiddenFill xmlns:a14="http://schemas.microsoft.com/office/drawing/2010/main">
+                <a:solidFill>
+                  <a:schemeClr val="accent1"/>
+                </a:solidFill>
+              </a14:hiddenFill>
+            </a:ext>
+            <a:ext uri="{91240B29-F687-4F45-9708-019B960494DF}">
+              <a14:hiddenLine xmlns:a14="http://schemas.microsoft.com/office/drawing/2010/main" w="9525">
+                <a:solidFill>
+                  <a:schemeClr val="tx1"/>
+                </a:solidFill>
+                <a:miter lim="800000"/>
+                <a:headEnd/>
+                <a:tailEnd/>
+              </a14:hiddenLine>
+            </a:ext>
+          </a:extLst>
+        </p:spPr>
+      </p:pic>
+      <p:sp>
+        <p:nvSpPr>
+          <p:cNvPr id="2" name="テキスト ボックス 1"/>
+          <p:cNvSpPr txBox="1"/>
+          <p:nvPr/>
+        </p:nvSpPr>
+        <p:spPr>
+          <a:xfrm>
+            <a:off x="2240310" y="283523"/>
+            <a:ext cx="864096" cy="369332"/>
+          </a:xfrm>
+          <a:prstGeom prst="rect">
+            <a:avLst/>
+          </a:prstGeom>
+          <a:solidFill>
+            <a:schemeClr val="bg1"/>
+          </a:solidFill>
+        </p:spPr>
+        <p:txBody>
+          <a:bodyPr wrap="square" rtlCol="0">
+            <a:spAutoFit/>
+          </a:bodyPr>
+          <a:lstStyle/>
+          <a:p>
+            <a:r>
+              <a:rPr kumimoji="1" lang="ja-JP" altLang="en-US" dirty="0" smtClean="0"/>
+              <a:t>成功</a:t>
+            </a:r>
+            <a:endParaRPr kumimoji="1" lang="ja-JP" altLang="en-US" dirty="0"/>
+          </a:p>
+        </p:txBody>
+      </p:sp>
+      <p:sp>
+        <p:nvSpPr>
+          <p:cNvPr id="4" name="テキスト ボックス 3"/>
+          <p:cNvSpPr txBox="1"/>
+          <p:nvPr/>
+        </p:nvSpPr>
+        <p:spPr>
+          <a:xfrm>
+            <a:off x="2244120" y="664523"/>
+            <a:ext cx="864096" cy="369332"/>
+          </a:xfrm>
+          <a:prstGeom prst="rect">
+            <a:avLst/>
+          </a:prstGeom>
+          <a:solidFill>
+            <a:schemeClr val="bg1"/>
+          </a:solidFill>
+        </p:spPr>
+        <p:txBody>
+          <a:bodyPr wrap="square" rtlCol="0">
+            <a:spAutoFit/>
+          </a:bodyPr>
+          <a:lstStyle/>
+          <a:p>
+            <a:r>
+              <a:rPr kumimoji="1" lang="ja-JP" altLang="en-US" dirty="0" smtClean="0"/>
+              <a:t>失敗</a:t>
+            </a:r>
+            <a:endParaRPr kumimoji="1" lang="ja-JP" altLang="en-US" dirty="0"/>
+          </a:p>
+        </p:txBody>
+      </p:sp>
+    </p:spTree>
+    <p:extLst>
+      <p:ext uri="{BB962C8B-B14F-4D97-AF65-F5344CB8AC3E}">
+        <p14:creationId xmlns:p14="http://schemas.microsoft.com/office/powerpoint/2010/main" val="1894960323"/>
       </p:ext>
     </p:extLst>
   </p:cSld>

</xml_diff>